<commit_message>
Not sure if there are actually any changes here.
</commit_message>
<xml_diff>
--- a/Presentation5.pptx
+++ b/Presentation5.pptx
@@ -3896,13 +3896,7 @@
               <a:rPr lang="en-US" sz="4800" i="1" dirty="0" smtClean="0">
                 <a:latin typeface="+mj-lt"/>
               </a:rPr>
-              <a:t>maximizes net </a:t>
-            </a:r>
-            <a:r>
-              <a:rPr lang="en-US" sz="4800" i="1" dirty="0" smtClean="0">
-                <a:latin typeface="+mj-lt"/>
-              </a:rPr>
-              <a:t>aggregate </a:t>
+              <a:t>maximizes net aggregate </a:t>
             </a:r>
             <a:r>
               <a:rPr lang="en-US" sz="4800" i="1" dirty="0">

</xml_diff>